<commit_message>
minor change to flow layout
</commit_message>
<xml_diff>
--- a/Documents/ProcessFlow.pptx
+++ b/Documents/ProcessFlow.pptx
@@ -3103,7 +3103,7 @@
         </p:nvGrpSpPr>
         <p:grpSpPr>
           <a:xfrm>
-            <a:off x="1066800" y="990600"/>
+            <a:off x="866057" y="990600"/>
             <a:ext cx="663574" cy="609600"/>
             <a:chOff x="1676400" y="1600200"/>
             <a:chExt cx="1828800" cy="1676400"/>
@@ -3279,7 +3279,7 @@
         </p:nvGrpSpPr>
         <p:grpSpPr>
           <a:xfrm>
-            <a:off x="1075315" y="2382981"/>
+            <a:off x="874572" y="2382981"/>
             <a:ext cx="663574" cy="609600"/>
             <a:chOff x="1676400" y="1600200"/>
             <a:chExt cx="1828800" cy="1676400"/>
@@ -3452,7 +3452,7 @@
         </p:nvGrpSpPr>
         <p:grpSpPr>
           <a:xfrm>
-            <a:off x="1066800" y="1685635"/>
+            <a:off x="866057" y="1685635"/>
             <a:ext cx="663574" cy="609600"/>
             <a:chOff x="1676400" y="1600200"/>
             <a:chExt cx="1828800" cy="1676400"/>
@@ -3628,7 +3628,7 @@
         </p:nvGrpSpPr>
         <p:grpSpPr>
           <a:xfrm>
-            <a:off x="1066800" y="3031835"/>
+            <a:off x="866057" y="3031835"/>
             <a:ext cx="663574" cy="609600"/>
             <a:chOff x="1676400" y="1600200"/>
             <a:chExt cx="1828800" cy="1676400"/>
@@ -3803,7 +3803,7 @@
         </p:nvSpPr>
         <p:spPr>
           <a:xfrm>
-            <a:off x="1831109" y="1269999"/>
+            <a:off x="1630366" y="1269999"/>
             <a:ext cx="152400" cy="138546"/>
           </a:xfrm>
           <a:prstGeom prst="rightArrow">
@@ -3852,7 +3852,7 @@
         </p:nvSpPr>
         <p:spPr>
           <a:xfrm>
-            <a:off x="1831109" y="1976580"/>
+            <a:off x="1630366" y="1976580"/>
             <a:ext cx="152400" cy="138546"/>
           </a:xfrm>
           <a:prstGeom prst="rightArrow">
@@ -3901,7 +3901,7 @@
         </p:nvSpPr>
         <p:spPr>
           <a:xfrm>
-            <a:off x="1831109" y="2646217"/>
+            <a:off x="1630366" y="2646217"/>
             <a:ext cx="152400" cy="138546"/>
           </a:xfrm>
           <a:prstGeom prst="rightArrow">
@@ -3950,7 +3950,7 @@
         </p:nvSpPr>
         <p:spPr>
           <a:xfrm>
-            <a:off x="1831109" y="3350489"/>
+            <a:off x="1630366" y="3350489"/>
             <a:ext cx="152400" cy="138546"/>
           </a:xfrm>
           <a:prstGeom prst="rightArrow">
@@ -3999,7 +3999,7 @@
         </p:nvSpPr>
         <p:spPr>
           <a:xfrm>
-            <a:off x="3124198" y="1625351"/>
+            <a:off x="2923455" y="1625351"/>
             <a:ext cx="762000" cy="697346"/>
           </a:xfrm>
           <a:prstGeom prst="rightArrow">
@@ -4047,7 +4047,7 @@
         </p:nvSpPr>
         <p:spPr>
           <a:xfrm>
-            <a:off x="4104531" y="426152"/>
+            <a:off x="3903788" y="426152"/>
             <a:ext cx="1814944" cy="2164648"/>
           </a:xfrm>
           <a:prstGeom prst="roundRect">
@@ -4111,7 +4111,7 @@
         </p:blipFill>
         <p:spPr bwMode="auto">
           <a:xfrm>
-            <a:off x="7314623" y="1590962"/>
+            <a:off x="7113880" y="1590962"/>
             <a:ext cx="1223818" cy="948459"/>
           </a:xfrm>
           <a:prstGeom prst="rect">
@@ -4137,7 +4137,7 @@
         </p:nvSpPr>
         <p:spPr>
           <a:xfrm>
-            <a:off x="6172200" y="1600200"/>
+            <a:off x="5971457" y="1600200"/>
             <a:ext cx="762000" cy="697346"/>
           </a:xfrm>
           <a:prstGeom prst="rightArrow">
@@ -4185,7 +4185,7 @@
         </p:nvSpPr>
         <p:spPr>
           <a:xfrm rot="5400000">
-            <a:off x="7646266" y="3320471"/>
+            <a:off x="7445523" y="3320471"/>
             <a:ext cx="762000" cy="697346"/>
           </a:xfrm>
           <a:prstGeom prst="rightArrow">
@@ -4233,7 +4233,7 @@
         </p:nvSpPr>
         <p:spPr>
           <a:xfrm>
-            <a:off x="7618269" y="4732675"/>
+            <a:off x="7417526" y="4732675"/>
             <a:ext cx="834736" cy="1129142"/>
           </a:xfrm>
           <a:prstGeom prst="roundRect">
@@ -4294,7 +4294,7 @@
         </p:blipFill>
         <p:spPr bwMode="auto">
           <a:xfrm>
-            <a:off x="3874655" y="5218747"/>
+            <a:off x="3673912" y="5218747"/>
             <a:ext cx="2133600" cy="517236"/>
           </a:xfrm>
           <a:prstGeom prst="rect">
@@ -4320,7 +4320,7 @@
         </p:nvSpPr>
         <p:spPr>
           <a:xfrm rot="10800000">
-            <a:off x="6172201" y="5414800"/>
+            <a:off x="5971458" y="5414800"/>
             <a:ext cx="762000" cy="697346"/>
           </a:xfrm>
           <a:prstGeom prst="rightArrow">
@@ -4368,7 +4368,7 @@
         </p:nvSpPr>
         <p:spPr>
           <a:xfrm rot="10800000">
-            <a:off x="3124199" y="5474853"/>
+            <a:off x="2923456" y="5474853"/>
             <a:ext cx="762000" cy="697346"/>
           </a:xfrm>
           <a:prstGeom prst="rightArrow">
@@ -4416,7 +4416,7 @@
         </p:nvSpPr>
         <p:spPr>
           <a:xfrm rot="16200000">
-            <a:off x="1435793" y="3994727"/>
+            <a:off x="1235050" y="3994727"/>
             <a:ext cx="762000" cy="697346"/>
           </a:xfrm>
           <a:prstGeom prst="rightArrow">
@@ -4464,7 +4464,7 @@
         </p:nvGrpSpPr>
         <p:grpSpPr>
           <a:xfrm>
-            <a:off x="2133600" y="990600"/>
+            <a:off x="1932857" y="990600"/>
             <a:ext cx="533400" cy="609600"/>
             <a:chOff x="2133600" y="990600"/>
             <a:chExt cx="533400" cy="609600"/>
@@ -4622,7 +4622,7 @@
         </p:nvSpPr>
         <p:spPr>
           <a:xfrm>
-            <a:off x="914400" y="426152"/>
+            <a:off x="713657" y="426152"/>
             <a:ext cx="1865095" cy="430887"/>
           </a:xfrm>
           <a:prstGeom prst="rect">
@@ -4669,7 +4669,7 @@
         </p:nvGrpSpPr>
         <p:grpSpPr>
           <a:xfrm>
-            <a:off x="2141220" y="1713344"/>
+            <a:off x="1940477" y="1713344"/>
             <a:ext cx="533400" cy="609600"/>
             <a:chOff x="2133600" y="990600"/>
             <a:chExt cx="533400" cy="609600"/>
@@ -4827,7 +4827,7 @@
         </p:nvGrpSpPr>
         <p:grpSpPr>
           <a:xfrm>
-            <a:off x="2141220" y="2382980"/>
+            <a:off x="1940477" y="2382980"/>
             <a:ext cx="533400" cy="609600"/>
             <a:chOff x="2133600" y="990600"/>
             <a:chExt cx="533400" cy="609600"/>
@@ -4982,7 +4982,7 @@
         </p:nvGrpSpPr>
         <p:grpSpPr>
           <a:xfrm>
-            <a:off x="2138218" y="3059544"/>
+            <a:off x="1937475" y="3059544"/>
             <a:ext cx="533400" cy="609600"/>
             <a:chOff x="2133600" y="990600"/>
             <a:chExt cx="533400" cy="609600"/>
@@ -5139,7 +5139,7 @@
         </p:nvSpPr>
         <p:spPr>
           <a:xfrm>
-            <a:off x="7384473" y="5953036"/>
+            <a:off x="7183730" y="5953036"/>
             <a:ext cx="1302327" cy="600164"/>
           </a:xfrm>
           <a:prstGeom prst="rect">
@@ -5186,7 +5186,7 @@
         </p:nvSpPr>
         <p:spPr>
           <a:xfrm>
-            <a:off x="7807036" y="4972128"/>
+            <a:off x="7606293" y="4972128"/>
             <a:ext cx="457200" cy="50291"/>
           </a:xfrm>
           <a:prstGeom prst="rect">
@@ -5235,7 +5235,7 @@
         </p:nvSpPr>
         <p:spPr>
           <a:xfrm>
-            <a:off x="7807036" y="5074687"/>
+            <a:off x="7606293" y="5074687"/>
             <a:ext cx="457200" cy="50291"/>
           </a:xfrm>
           <a:prstGeom prst="rect">
@@ -5284,7 +5284,7 @@
         </p:nvSpPr>
         <p:spPr>
           <a:xfrm>
-            <a:off x="7807036" y="5177246"/>
+            <a:off x="7606293" y="5177246"/>
             <a:ext cx="457200" cy="50291"/>
           </a:xfrm>
           <a:prstGeom prst="rect">
@@ -5333,7 +5333,7 @@
         </p:nvSpPr>
         <p:spPr>
           <a:xfrm>
-            <a:off x="7807036" y="5279805"/>
+            <a:off x="7606293" y="5279805"/>
             <a:ext cx="457200" cy="50291"/>
           </a:xfrm>
           <a:prstGeom prst="rect">
@@ -5379,7 +5379,7 @@
         </p:nvSpPr>
         <p:spPr>
           <a:xfrm>
-            <a:off x="7807036" y="5382364"/>
+            <a:off x="7606293" y="5382364"/>
             <a:ext cx="457200" cy="50291"/>
           </a:xfrm>
           <a:prstGeom prst="rect">
@@ -5425,7 +5425,7 @@
         </p:nvSpPr>
         <p:spPr>
           <a:xfrm>
-            <a:off x="7807036" y="5587482"/>
+            <a:off x="7606293" y="5587482"/>
             <a:ext cx="457200" cy="50291"/>
           </a:xfrm>
           <a:prstGeom prst="rect">
@@ -5471,7 +5471,7 @@
         </p:nvSpPr>
         <p:spPr>
           <a:xfrm>
-            <a:off x="4209472" y="466636"/>
+            <a:off x="4008729" y="466636"/>
             <a:ext cx="1563255" cy="600164"/>
           </a:xfrm>
           <a:prstGeom prst="rect">
@@ -5518,7 +5518,7 @@
         </p:nvSpPr>
         <p:spPr>
           <a:xfrm>
-            <a:off x="7250618" y="932565"/>
+            <a:off x="7049875" y="932565"/>
             <a:ext cx="1502930" cy="600164"/>
           </a:xfrm>
           <a:prstGeom prst="rect">
@@ -5565,7 +5565,7 @@
         </p:nvSpPr>
         <p:spPr>
           <a:xfrm>
-            <a:off x="7807036" y="5484923"/>
+            <a:off x="7606293" y="5484923"/>
             <a:ext cx="457200" cy="50291"/>
           </a:xfrm>
           <a:prstGeom prst="rect">
@@ -5611,7 +5611,7 @@
         </p:nvSpPr>
         <p:spPr>
           <a:xfrm>
-            <a:off x="7807036" y="5690039"/>
+            <a:off x="7606293" y="5690039"/>
             <a:ext cx="457200" cy="50291"/>
           </a:xfrm>
           <a:prstGeom prst="rect">
@@ -5659,7 +5659,7 @@
         </p:nvSpPr>
         <p:spPr>
           <a:xfrm>
-            <a:off x="7807036" y="4869569"/>
+            <a:off x="7606293" y="4869569"/>
             <a:ext cx="457200" cy="50291"/>
           </a:xfrm>
           <a:prstGeom prst="rect">
@@ -5708,7 +5708,7 @@
         </p:nvGrpSpPr>
         <p:grpSpPr>
           <a:xfrm>
-            <a:off x="4399972" y="1147361"/>
+            <a:off x="4199229" y="1147361"/>
             <a:ext cx="533400" cy="609600"/>
             <a:chOff x="2133600" y="990600"/>
             <a:chExt cx="533400" cy="609600"/>
@@ -5866,7 +5866,7 @@
         </p:nvGrpSpPr>
         <p:grpSpPr>
           <a:xfrm>
-            <a:off x="4407592" y="1870105"/>
+            <a:off x="4206849" y="1870105"/>
             <a:ext cx="533400" cy="609600"/>
             <a:chOff x="2133600" y="990600"/>
             <a:chExt cx="533400" cy="609600"/>
@@ -6024,7 +6024,7 @@
         </p:nvGrpSpPr>
         <p:grpSpPr>
           <a:xfrm>
-            <a:off x="5029200" y="1161472"/>
+            <a:off x="4828457" y="1161472"/>
             <a:ext cx="533400" cy="609600"/>
             <a:chOff x="2133600" y="990600"/>
             <a:chExt cx="533400" cy="609600"/>
@@ -6179,7 +6179,7 @@
         </p:nvGrpSpPr>
         <p:grpSpPr>
           <a:xfrm>
-            <a:off x="5026198" y="1838036"/>
+            <a:off x="4825455" y="1838036"/>
             <a:ext cx="533400" cy="609600"/>
             <a:chOff x="2133600" y="990600"/>
             <a:chExt cx="533400" cy="609600"/>
@@ -6336,7 +6336,7 @@
         </p:nvSpPr>
         <p:spPr>
           <a:xfrm>
-            <a:off x="4315805" y="5826039"/>
+            <a:off x="4115062" y="5826039"/>
             <a:ext cx="1603665" cy="600164"/>
           </a:xfrm>
           <a:prstGeom prst="rect">
@@ -6383,7 +6383,7 @@
         </p:nvSpPr>
         <p:spPr>
           <a:xfrm>
-            <a:off x="693604" y="290686"/>
+            <a:off x="492861" y="290686"/>
             <a:ext cx="2246376" cy="3603991"/>
           </a:xfrm>
           <a:prstGeom prst="roundRect">
@@ -6432,7 +6432,7 @@
         </p:nvCxnSpPr>
         <p:spPr>
           <a:xfrm flipH="1">
-            <a:off x="4738452" y="1454450"/>
+            <a:off x="4537709" y="1454450"/>
             <a:ext cx="1" cy="201168"/>
           </a:xfrm>
           <a:prstGeom prst="straightConnector1">
@@ -6468,7 +6468,7 @@
         </p:nvCxnSpPr>
         <p:spPr>
           <a:xfrm flipH="1">
-            <a:off x="5354783" y="1454450"/>
+            <a:off x="5154040" y="1454450"/>
             <a:ext cx="1" cy="201168"/>
           </a:xfrm>
           <a:prstGeom prst="straightConnector1">
@@ -6504,7 +6504,7 @@
         </p:nvCxnSpPr>
         <p:spPr>
           <a:xfrm flipH="1">
-            <a:off x="4738453" y="2151815"/>
+            <a:off x="4537710" y="2151815"/>
             <a:ext cx="1" cy="201168"/>
           </a:xfrm>
           <a:prstGeom prst="straightConnector1">
@@ -6540,7 +6540,7 @@
         </p:nvCxnSpPr>
         <p:spPr>
           <a:xfrm flipH="1">
-            <a:off x="5354784" y="2151815"/>
+            <a:off x="5154041" y="2151815"/>
             <a:ext cx="1" cy="201168"/>
           </a:xfrm>
           <a:prstGeom prst="straightConnector1">
@@ -6576,7 +6576,7 @@
         </p:nvSpPr>
         <p:spPr>
           <a:xfrm rot="16200000">
-            <a:off x="4701540" y="1572257"/>
+            <a:off x="4500797" y="1572257"/>
             <a:ext cx="76200" cy="182880"/>
           </a:xfrm>
           <a:prstGeom prst="leftBracket">
@@ -6619,7 +6619,7 @@
         </p:nvSpPr>
         <p:spPr>
           <a:xfrm rot="16200000">
-            <a:off x="5316685" y="1572257"/>
+            <a:off x="5115942" y="1572257"/>
             <a:ext cx="76200" cy="182880"/>
           </a:xfrm>
           <a:prstGeom prst="leftBracket">
@@ -6662,7 +6662,7 @@
         </p:nvSpPr>
         <p:spPr>
           <a:xfrm rot="16200000">
-            <a:off x="4701538" y="2278841"/>
+            <a:off x="4500795" y="2278841"/>
             <a:ext cx="76200" cy="182880"/>
           </a:xfrm>
           <a:prstGeom prst="leftBracket">
@@ -6705,7 +6705,7 @@
         </p:nvSpPr>
         <p:spPr>
           <a:xfrm rot="16200000">
-            <a:off x="5316683" y="2278841"/>
+            <a:off x="5115940" y="2278841"/>
             <a:ext cx="76200" cy="182880"/>
           </a:xfrm>
           <a:prstGeom prst="leftBracket">
@@ -6748,7 +6748,7 @@
         </p:nvSpPr>
         <p:spPr>
           <a:xfrm>
-            <a:off x="3326146" y="3046148"/>
+            <a:off x="3125403" y="3046148"/>
             <a:ext cx="5186647" cy="1384995"/>
           </a:xfrm>
           <a:prstGeom prst="rect">
@@ -6801,7 +6801,7 @@
         </p:nvSpPr>
         <p:spPr>
           <a:xfrm>
-            <a:off x="7200251" y="863601"/>
+            <a:off x="6999508" y="863601"/>
             <a:ext cx="1603665" cy="1955799"/>
           </a:xfrm>
           <a:prstGeom prst="roundRect">
@@ -6850,7 +6850,7 @@
         </p:nvSpPr>
         <p:spPr>
           <a:xfrm>
-            <a:off x="7225434" y="4588165"/>
+            <a:off x="7024691" y="4588165"/>
             <a:ext cx="1603665" cy="2021793"/>
           </a:xfrm>
           <a:prstGeom prst="roundRect">
@@ -6899,7 +6899,7 @@
         </p:nvSpPr>
         <p:spPr>
           <a:xfrm>
-            <a:off x="4038600" y="5124978"/>
+            <a:off x="3837857" y="5124978"/>
             <a:ext cx="1969655" cy="1301225"/>
           </a:xfrm>
           <a:prstGeom prst="roundRect">
@@ -6948,7 +6948,7 @@
         </p:nvGrpSpPr>
         <p:grpSpPr>
           <a:xfrm>
-            <a:off x="831965" y="4936869"/>
+            <a:off x="631222" y="4936869"/>
             <a:ext cx="1969655" cy="1768731"/>
             <a:chOff x="849745" y="4936869"/>
             <a:chExt cx="1969655" cy="1768731"/>

</xml_diff>